<commit_message>
# ajout de l'article tiré de la présentation off du printemps des fameuses non fait à cause de la COVID-19
</commit_message>
<xml_diff>
--- a/content/post/presentation_0993421052631561 308_eng.pptx
+++ b/content/post/presentation_0993421052631561 308_eng.pptx
@@ -10641,10 +10641,10 @@
       </p:pic>
       <p:sp>
         <p:nvSpPr>
-          <p:cNvPr id="9" name="Espace réservé du contenu 5">
+          <p:cNvPr id="12" name="Espace réservé du contenu 5">
             <a:extLst>
               <a:ext uri="{FF2B5EF4-FFF2-40B4-BE49-F238E27FC236}">
-                <a16:creationId xmlns:a16="http://schemas.microsoft.com/office/drawing/2014/main" id="{B03E24B0-0FFB-41D2-9F57-117B504B8DDB}"/>
+                <a16:creationId xmlns:a16="http://schemas.microsoft.com/office/drawing/2014/main" id="{CC60EA1A-A2D0-4F79-BCA8-EBC8F9EBD337}"/>
               </a:ext>
             </a:extLst>
           </p:cNvPr>
@@ -10657,8 +10657,8 @@
         </p:nvSpPr>
         <p:spPr>
           <a:xfrm>
-            <a:off x="10771188" y="5324171"/>
-            <a:ext cx="1141412" cy="824583"/>
+            <a:off x="10771188" y="5042263"/>
+            <a:ext cx="1141412" cy="1106491"/>
           </a:xfrm>
         </p:spPr>
         <p:txBody>
@@ -10666,7 +10666,7 @@
             <a:noAutofit/>
           </a:bodyPr>
           <a:lstStyle>
-            <a:lvl1pPr marL="0" indent="0">
+            <a:lvl1pPr marL="0" indent="0" algn="ctr">
               <a:buNone/>
               <a:defRPr sz="1100">
                 <a:solidFill>
@@ -11905,8 +11905,8 @@
         </p:nvSpPr>
         <p:spPr>
           <a:xfrm>
-            <a:off x="10771188" y="5324171"/>
-            <a:ext cx="1141412" cy="824583"/>
+            <a:off x="10771188" y="5042263"/>
+            <a:ext cx="1141412" cy="1106491"/>
           </a:xfrm>
         </p:spPr>
         <p:txBody>
@@ -11914,7 +11914,7 @@
             <a:noAutofit/>
           </a:bodyPr>
           <a:lstStyle>
-            <a:lvl1pPr marL="0" indent="0">
+            <a:lvl1pPr marL="0" indent="0" algn="ctr">
               <a:buNone/>
               <a:defRPr sz="1100">
                 <a:solidFill>
@@ -12242,10 +12242,10 @@
       </p:pic>
       <p:sp>
         <p:nvSpPr>
-          <p:cNvPr id="5" name="Espace réservé du contenu 5">
+          <p:cNvPr id="6" name="Espace réservé du contenu 5">
             <a:extLst>
               <a:ext uri="{FF2B5EF4-FFF2-40B4-BE49-F238E27FC236}">
-                <a16:creationId xmlns:a16="http://schemas.microsoft.com/office/drawing/2014/main" id="{8B2AE210-A494-40BA-B20B-2B814E49DC6A}"/>
+                <a16:creationId xmlns:a16="http://schemas.microsoft.com/office/drawing/2014/main" id="{F53F2462-26C6-4F8B-8F6C-1C752F6D8607}"/>
               </a:ext>
             </a:extLst>
           </p:cNvPr>
@@ -12258,8 +12258,8 @@
         </p:nvSpPr>
         <p:spPr>
           <a:xfrm>
-            <a:off x="10771188" y="5324171"/>
-            <a:ext cx="1141412" cy="824583"/>
+            <a:off x="10771188" y="5042263"/>
+            <a:ext cx="1141412" cy="1106491"/>
           </a:xfrm>
         </p:spPr>
         <p:txBody>
@@ -12267,7 +12267,7 @@
             <a:noAutofit/>
           </a:bodyPr>
           <a:lstStyle>
-            <a:lvl1pPr marL="0" indent="0">
+            <a:lvl1pPr marL="0" indent="0" algn="ctr">
               <a:buNone/>
               <a:defRPr sz="1100">
                 <a:solidFill>
@@ -21646,10 +21646,10 @@
       </p:pic>
       <p:sp>
         <p:nvSpPr>
-          <p:cNvPr id="5" name="Espace réservé du contenu 5">
+          <p:cNvPr id="8" name="Espace réservé du contenu 5">
             <a:extLst>
               <a:ext uri="{FF2B5EF4-FFF2-40B4-BE49-F238E27FC236}">
-                <a16:creationId xmlns:a16="http://schemas.microsoft.com/office/drawing/2014/main" id="{7CB7B955-42C1-4368-A0DD-40A487B84FDA}"/>
+                <a16:creationId xmlns:a16="http://schemas.microsoft.com/office/drawing/2014/main" id="{E05F715F-41CE-4363-9A8A-E629E466A6B7}"/>
               </a:ext>
             </a:extLst>
           </p:cNvPr>
@@ -21662,8 +21662,8 @@
         </p:nvSpPr>
         <p:spPr>
           <a:xfrm>
-            <a:off x="10771188" y="5324171"/>
-            <a:ext cx="1141412" cy="824583"/>
+            <a:off x="10771188" y="5042263"/>
+            <a:ext cx="1141412" cy="1106491"/>
           </a:xfrm>
         </p:spPr>
         <p:txBody>
@@ -21671,7 +21671,7 @@
             <a:noAutofit/>
           </a:bodyPr>
           <a:lstStyle>
-            <a:lvl1pPr marL="0" indent="0">
+            <a:lvl1pPr marL="0" indent="0" algn="ctr">
               <a:buNone/>
               <a:defRPr sz="1100">
                 <a:solidFill>
@@ -23241,8 +23241,8 @@
         </p:nvSpPr>
         <p:spPr>
           <a:xfrm>
-            <a:off x="10771188" y="5324171"/>
-            <a:ext cx="1141412" cy="824583"/>
+            <a:off x="10771188" y="5042263"/>
+            <a:ext cx="1141412" cy="1106491"/>
           </a:xfrm>
         </p:spPr>
         <p:txBody>
@@ -23348,8 +23348,8 @@
         </p:nvSpPr>
         <p:spPr>
           <a:xfrm>
-            <a:off x="10771188" y="5324171"/>
-            <a:ext cx="1141412" cy="824583"/>
+            <a:off x="10771188" y="5042263"/>
+            <a:ext cx="1141412" cy="1106491"/>
           </a:xfrm>
         </p:spPr>
         <p:txBody>
@@ -23508,8 +23508,8 @@
         </p:nvSpPr>
         <p:spPr>
           <a:xfrm>
-            <a:off x="10771188" y="5324171"/>
-            <a:ext cx="1141412" cy="824583"/>
+            <a:off x="10771188" y="5042263"/>
+            <a:ext cx="1141412" cy="1106491"/>
           </a:xfrm>
         </p:spPr>
         <p:txBody>
@@ -23562,8 +23562,8 @@
         </p:nvSpPr>
         <p:spPr>
           <a:xfrm>
-            <a:off x="10771188" y="5324171"/>
-            <a:ext cx="1141412" cy="824583"/>
+            <a:off x="10771188" y="5042263"/>
+            <a:ext cx="1141412" cy="1106491"/>
           </a:xfrm>
         </p:spPr>
         <p:txBody>

</xml_diff>